<commit_message>
Atualização slides de aulas
</commit_message>
<xml_diff>
--- a/01 Classes/Aula 01 Desenvolvimento Web Caracterização.pptx
+++ b/01 Classes/Aula 01 Desenvolvimento Web Caracterização.pptx
@@ -9597,7 +9597,28 @@
                 <a:latin typeface="Times New Roman" panose="02020603050405020304" pitchFamily="18" charset="0"/>
                 <a:cs typeface="Times New Roman" panose="02020603050405020304" pitchFamily="18" charset="0"/>
               </a:rPr>
-              <a:t>, etc.</a:t>
+              <a:t>, </a:t>
+            </a:r>
+            <a:r>
+              <a:rPr lang="pt-BR" sz="2400" dirty="0" err="1">
+                <a:latin typeface="Times New Roman" panose="02020603050405020304" pitchFamily="18" charset="0"/>
+                <a:cs typeface="Times New Roman" panose="02020603050405020304" pitchFamily="18" charset="0"/>
+              </a:rPr>
+              <a:t>BitBucket</a:t>
+            </a:r>
+            <a:r>
+              <a:rPr lang="pt-BR" sz="2400">
+                <a:latin typeface="Times New Roman" panose="02020603050405020304" pitchFamily="18" charset="0"/>
+                <a:cs typeface="Times New Roman" panose="02020603050405020304" pitchFamily="18" charset="0"/>
+              </a:rPr>
+              <a:t>, etc</a:t>
+            </a:r>
+            <a:r>
+              <a:rPr lang="pt-BR" sz="2400" dirty="0">
+                <a:latin typeface="Times New Roman" panose="02020603050405020304" pitchFamily="18" charset="0"/>
+                <a:cs typeface="Times New Roman" panose="02020603050405020304" pitchFamily="18" charset="0"/>
+              </a:rPr>
+              <a:t>.</a:t>
             </a:r>
           </a:p>
           <a:p>

</xml_diff>